<commit_message>
Update Aim 1 Results 25.10.21.pptx
Provided yes/no interpretation of stim effect for each parameter
</commit_message>
<xml_diff>
--- a/results/Aim 1 Results 25.10.21.pptx
+++ b/results/Aim 1 Results 25.10.21.pptx
@@ -6119,6 +6119,41 @@
           </a:prstGeom>
         </p:spPr>
       </p:pic>
+      <p:sp>
+        <p:nvSpPr>
+          <p:cNvPr id="2" name="TextBox 1">
+            <a:extLst>
+              <a:ext uri="{FF2B5EF4-FFF2-40B4-BE49-F238E27FC236}">
+                <a16:creationId xmlns:a16="http://schemas.microsoft.com/office/drawing/2014/main" id="{02E380F0-AA3D-8AF2-B46B-74CEE706E876}"/>
+              </a:ext>
+            </a:extLst>
+          </p:cNvPr>
+          <p:cNvSpPr txBox="1"/>
+          <p:nvPr/>
+        </p:nvSpPr>
+        <p:spPr>
+          <a:xfrm>
+            <a:off x="259197" y="5942568"/>
+            <a:ext cx="3481018" cy="369332"/>
+          </a:xfrm>
+          <a:prstGeom prst="rect">
+            <a:avLst/>
+          </a:prstGeom>
+          <a:noFill/>
+        </p:spPr>
+        <p:txBody>
+          <a:bodyPr wrap="none" rtlCol="0">
+            <a:spAutoFit/>
+          </a:bodyPr>
+          <a:lstStyle/>
+          <a:p>
+            <a:r>
+              <a:rPr lang="en-US" b="1" dirty="0"/>
+              <a:t>Interpretation: NO STIM EFFECT</a:t>
+            </a:r>
+          </a:p>
+        </p:txBody>
+      </p:sp>
     </p:spTree>
     <p:extLst>
       <p:ext uri="{BB962C8B-B14F-4D97-AF65-F5344CB8AC3E}">
@@ -6319,6 +6354,41 @@
           </a:prstGeom>
         </p:spPr>
       </p:pic>
+      <p:sp>
+        <p:nvSpPr>
+          <p:cNvPr id="3" name="TextBox 2">
+            <a:extLst>
+              <a:ext uri="{FF2B5EF4-FFF2-40B4-BE49-F238E27FC236}">
+                <a16:creationId xmlns:a16="http://schemas.microsoft.com/office/drawing/2014/main" id="{E0B046F4-46D9-DB6B-6E79-D4DA7AA2E24B}"/>
+              </a:ext>
+            </a:extLst>
+          </p:cNvPr>
+          <p:cNvSpPr txBox="1"/>
+          <p:nvPr/>
+        </p:nvSpPr>
+        <p:spPr>
+          <a:xfrm>
+            <a:off x="259197" y="5942568"/>
+            <a:ext cx="3481018" cy="369332"/>
+          </a:xfrm>
+          <a:prstGeom prst="rect">
+            <a:avLst/>
+          </a:prstGeom>
+          <a:noFill/>
+        </p:spPr>
+        <p:txBody>
+          <a:bodyPr wrap="none" rtlCol="0">
+            <a:spAutoFit/>
+          </a:bodyPr>
+          <a:lstStyle/>
+          <a:p>
+            <a:r>
+              <a:rPr lang="en-US" b="1" dirty="0"/>
+              <a:t>Interpretation: NO STIM EFFECT</a:t>
+            </a:r>
+          </a:p>
+        </p:txBody>
+      </p:sp>
     </p:spTree>
     <p:extLst>
       <p:ext uri="{BB962C8B-B14F-4D97-AF65-F5344CB8AC3E}">
@@ -6515,6 +6585,41 @@
           </a:prstGeom>
         </p:spPr>
       </p:pic>
+      <p:sp>
+        <p:nvSpPr>
+          <p:cNvPr id="7" name="TextBox 6">
+            <a:extLst>
+              <a:ext uri="{FF2B5EF4-FFF2-40B4-BE49-F238E27FC236}">
+                <a16:creationId xmlns:a16="http://schemas.microsoft.com/office/drawing/2014/main" id="{95508674-050D-E33C-1572-F00AFBEE07C4}"/>
+              </a:ext>
+            </a:extLst>
+          </p:cNvPr>
+          <p:cNvSpPr txBox="1"/>
+          <p:nvPr/>
+        </p:nvSpPr>
+        <p:spPr>
+          <a:xfrm>
+            <a:off x="259197" y="5942568"/>
+            <a:ext cx="3481018" cy="369332"/>
+          </a:xfrm>
+          <a:prstGeom prst="rect">
+            <a:avLst/>
+          </a:prstGeom>
+          <a:noFill/>
+        </p:spPr>
+        <p:txBody>
+          <a:bodyPr wrap="none" rtlCol="0">
+            <a:spAutoFit/>
+          </a:bodyPr>
+          <a:lstStyle/>
+          <a:p>
+            <a:r>
+              <a:rPr lang="en-US" b="1" dirty="0"/>
+              <a:t>Interpretation: NO STIM EFFECT</a:t>
+            </a:r>
+          </a:p>
+        </p:txBody>
+      </p:sp>
     </p:spTree>
     <p:extLst>
       <p:ext uri="{BB962C8B-B14F-4D97-AF65-F5344CB8AC3E}">
@@ -7464,6 +7569,41 @@
           </a:prstGeom>
         </p:spPr>
       </p:pic>
+      <p:sp>
+        <p:nvSpPr>
+          <p:cNvPr id="2" name="TextBox 1">
+            <a:extLst>
+              <a:ext uri="{FF2B5EF4-FFF2-40B4-BE49-F238E27FC236}">
+                <a16:creationId xmlns:a16="http://schemas.microsoft.com/office/drawing/2014/main" id="{23753A4F-9CBE-E2C0-F344-3C8146666674}"/>
+              </a:ext>
+            </a:extLst>
+          </p:cNvPr>
+          <p:cNvSpPr txBox="1"/>
+          <p:nvPr/>
+        </p:nvSpPr>
+        <p:spPr>
+          <a:xfrm>
+            <a:off x="259197" y="5942568"/>
+            <a:ext cx="3481018" cy="369332"/>
+          </a:xfrm>
+          <a:prstGeom prst="rect">
+            <a:avLst/>
+          </a:prstGeom>
+          <a:noFill/>
+        </p:spPr>
+        <p:txBody>
+          <a:bodyPr wrap="none" rtlCol="0">
+            <a:spAutoFit/>
+          </a:bodyPr>
+          <a:lstStyle/>
+          <a:p>
+            <a:r>
+              <a:rPr lang="en-US" b="1" dirty="0"/>
+              <a:t>Interpretation: NO STIM EFFECT</a:t>
+            </a:r>
+          </a:p>
+        </p:txBody>
+      </p:sp>
     </p:spTree>
     <p:extLst>
       <p:ext uri="{BB962C8B-B14F-4D97-AF65-F5344CB8AC3E}">
@@ -7694,6 +7834,41 @@
           </a:prstGeom>
         </p:spPr>
       </p:pic>
+      <p:sp>
+        <p:nvSpPr>
+          <p:cNvPr id="3" name="TextBox 2">
+            <a:extLst>
+              <a:ext uri="{FF2B5EF4-FFF2-40B4-BE49-F238E27FC236}">
+                <a16:creationId xmlns:a16="http://schemas.microsoft.com/office/drawing/2014/main" id="{AC97D6F3-9722-1364-A475-74B889F65F5F}"/>
+              </a:ext>
+            </a:extLst>
+          </p:cNvPr>
+          <p:cNvSpPr txBox="1"/>
+          <p:nvPr/>
+        </p:nvSpPr>
+        <p:spPr>
+          <a:xfrm>
+            <a:off x="259197" y="5942568"/>
+            <a:ext cx="3481018" cy="369332"/>
+          </a:xfrm>
+          <a:prstGeom prst="rect">
+            <a:avLst/>
+          </a:prstGeom>
+          <a:noFill/>
+        </p:spPr>
+        <p:txBody>
+          <a:bodyPr wrap="none" rtlCol="0">
+            <a:spAutoFit/>
+          </a:bodyPr>
+          <a:lstStyle/>
+          <a:p>
+            <a:r>
+              <a:rPr lang="en-US" b="1" dirty="0"/>
+              <a:t>Interpretation: NO STIM EFFECT</a:t>
+            </a:r>
+          </a:p>
+        </p:txBody>
+      </p:sp>
     </p:spTree>
     <p:extLst>
       <p:ext uri="{BB962C8B-B14F-4D97-AF65-F5344CB8AC3E}">
@@ -7924,6 +8099,41 @@
           </a:prstGeom>
         </p:spPr>
       </p:pic>
+      <p:sp>
+        <p:nvSpPr>
+          <p:cNvPr id="2" name="TextBox 1">
+            <a:extLst>
+              <a:ext uri="{FF2B5EF4-FFF2-40B4-BE49-F238E27FC236}">
+                <a16:creationId xmlns:a16="http://schemas.microsoft.com/office/drawing/2014/main" id="{30A2CDD4-0619-44CD-FAD2-1BCEB7D3F1CF}"/>
+              </a:ext>
+            </a:extLst>
+          </p:cNvPr>
+          <p:cNvSpPr txBox="1"/>
+          <p:nvPr/>
+        </p:nvSpPr>
+        <p:spPr>
+          <a:xfrm>
+            <a:off x="259197" y="5942568"/>
+            <a:ext cx="3097899" cy="369332"/>
+          </a:xfrm>
+          <a:prstGeom prst="rect">
+            <a:avLst/>
+          </a:prstGeom>
+          <a:noFill/>
+        </p:spPr>
+        <p:txBody>
+          <a:bodyPr wrap="none" rtlCol="0">
+            <a:spAutoFit/>
+          </a:bodyPr>
+          <a:lstStyle/>
+          <a:p>
+            <a:r>
+              <a:rPr lang="en-US" b="1" dirty="0"/>
+              <a:t>Interpretation: STIM EFFECT</a:t>
+            </a:r>
+          </a:p>
+        </p:txBody>
+      </p:sp>
     </p:spTree>
     <p:extLst>
       <p:ext uri="{BB962C8B-B14F-4D97-AF65-F5344CB8AC3E}">

</xml_diff>